<commit_message>
updated markov code to align with tut
</commit_message>
<xml_diff>
--- a/static/Course_Modularization/Decision trees/Slides/CEA and Decision Modeling Overview_with Decision tree slides.pptx
+++ b/static/Course_Modularization/Decision trees/Slides/CEA and Decision Modeling Overview_with Decision tree slides.pptx
@@ -211,7 +211,7 @@
           <a:p>
             <a:fld id="{80022054-F6B9-B04E-9F80-BE6C2BED9348}" type="datetimeFigureOut">
               <a:rPr lang="en-US" smtClean="0"/>
-              <a:t>2/3/20</a:t>
+              <a:t>2022-08-26</a:t>
             </a:fld>
             <a:endParaRPr lang="en-US"/>
           </a:p>
@@ -2534,7 +2534,7 @@
           <a:p>
             <a:fld id="{CB634AAD-AC3C-4F24-B5C0-1761CB9C20B3}" type="datetime1">
               <a:rPr lang="en-US" smtClean="0"/>
-              <a:t>2/3/20</a:t>
+              <a:t>2022-08-26</a:t>
             </a:fld>
             <a:endParaRPr lang="en-US"/>
           </a:p>
@@ -2867,7 +2867,7 @@
           <a:p>
             <a:fld id="{AF58B934-03E5-4DEE-840D-354C57FF6DD8}" type="datetime1">
               <a:rPr lang="en-US" smtClean="0"/>
-              <a:t>2/3/20</a:t>
+              <a:t>2022-08-26</a:t>
             </a:fld>
             <a:endParaRPr lang="en-US"/>
           </a:p>
@@ -3051,7 +3051,7 @@
           <a:p>
             <a:fld id="{CDBD6EDD-8212-4CC1-A46C-60F2740FE912}" type="datetime1">
               <a:rPr lang="en-US" smtClean="0"/>
-              <a:t>2/3/20</a:t>
+              <a:t>2022-08-26</a:t>
             </a:fld>
             <a:endParaRPr lang="en-US"/>
           </a:p>
@@ -3241,7 +3241,7 @@
           <a:p>
             <a:fld id="{ECC9A538-5928-443A-B2DD-6EEAA70C9EA3}" type="datetime1">
               <a:rPr lang="en-US" smtClean="0"/>
-              <a:t>2/3/20</a:t>
+              <a:t>2022-08-26</a:t>
             </a:fld>
             <a:endParaRPr lang="en-US"/>
           </a:p>
@@ -3393,7 +3393,7 @@
           <a:p>
             <a:fld id="{F9657FAC-F191-4D41-846F-1D23273BCACE}" type="datetime1">
               <a:rPr lang="en-US" smtClean="0"/>
-              <a:t>2/3/20</a:t>
+              <a:t>2022-08-26</a:t>
             </a:fld>
             <a:endParaRPr lang="en-US"/>
           </a:p>
@@ -3484,7 +3484,7 @@
           <a:p>
             <a:fld id="{BFCD98B2-BE87-44A5-9DF5-DF786278A694}" type="datetime1">
               <a:rPr lang="en-US" smtClean="0"/>
-              <a:t>2/3/20</a:t>
+              <a:t>2022-08-26</a:t>
             </a:fld>
             <a:endParaRPr lang="en-US"/>
           </a:p>
@@ -3522,7 +3522,7 @@
           <a:noFill/>
           <a:extLst>
             <a:ext uri="{909E8E84-426E-40dd-AFC4-6F175D3DCCD1}">
-              <a14:hiddenFill xmlns="" xmlns:a14="http://schemas.microsoft.com/office/drawing/2010/main">
+              <a14:hiddenFill xmlns:a14="http://schemas.microsoft.com/office/drawing/2010/main" xmlns="">
                 <a:solidFill>
                   <a:srgbClr val="FFFFFF"/>
                 </a:solidFill>
@@ -3563,7 +3563,7 @@
           <a:noFill/>
           <a:extLst>
             <a:ext uri="{909E8E84-426E-40dd-AFC4-6F175D3DCCD1}">
-              <a14:hiddenFill xmlns="" xmlns:a14="http://schemas.microsoft.com/office/drawing/2010/main">
+              <a14:hiddenFill xmlns:a14="http://schemas.microsoft.com/office/drawing/2010/main" xmlns="">
                 <a:solidFill>
                   <a:srgbClr val="FFFFFF"/>
                 </a:solidFill>
@@ -4886,7 +4886,7 @@
           <a:noFill/>
           <a:extLst>
             <a:ext uri="{909E8E84-426E-40dd-AFC4-6F175D3DCCD1}">
-              <a14:hiddenFill xmlns="" xmlns:a14="http://schemas.microsoft.com/office/drawing/2010/main">
+              <a14:hiddenFill xmlns:a14="http://schemas.microsoft.com/office/drawing/2010/main" xmlns="">
                 <a:solidFill>
                   <a:srgbClr val="FFFFFF"/>
                 </a:solidFill>
@@ -4925,7 +4925,7 @@
           <a:noFill/>
           <a:extLst>
             <a:ext uri="{909E8E84-426E-40dd-AFC4-6F175D3DCCD1}">
-              <a14:hiddenFill xmlns="" xmlns:a14="http://schemas.microsoft.com/office/drawing/2010/main">
+              <a14:hiddenFill xmlns:a14="http://schemas.microsoft.com/office/drawing/2010/main" xmlns="">
                 <a:solidFill>
                   <a:srgbClr val="FFFFFF"/>
                 </a:solidFill>
@@ -5020,7 +5020,7 @@
           <a:noFill/>
           <a:extLst>
             <a:ext uri="{909E8E84-426E-40dd-AFC4-6F175D3DCCD1}">
-              <a14:hiddenFill xmlns="" xmlns:a14="http://schemas.microsoft.com/office/drawing/2010/main">
+              <a14:hiddenFill xmlns:a14="http://schemas.microsoft.com/office/drawing/2010/main" xmlns="">
                 <a:solidFill>
                   <a:srgbClr val="FFFFFF"/>
                 </a:solidFill>
@@ -5061,7 +5061,7 @@
           <a:noFill/>
           <a:extLst>
             <a:ext uri="{909E8E84-426E-40dd-AFC4-6F175D3DCCD1}">
-              <a14:hiddenFill xmlns="" xmlns:a14="http://schemas.microsoft.com/office/drawing/2010/main">
+              <a14:hiddenFill xmlns:a14="http://schemas.microsoft.com/office/drawing/2010/main" xmlns="">
                 <a:solidFill>
                   <a:srgbClr val="FFFFFF"/>
                 </a:solidFill>
@@ -5106,14 +5106,14 @@
           <a:effectLst/>
           <a:extLst>
             <a:ext uri="{909E8E84-426E-40dd-AFC4-6F175D3DCCD1}">
-              <a14:hiddenFill xmlns="" xmlns:a14="http://schemas.microsoft.com/office/drawing/2010/main">
+              <a14:hiddenFill xmlns:a14="http://schemas.microsoft.com/office/drawing/2010/main" xmlns="">
                 <a:solidFill>
                   <a:schemeClr val="accent1"/>
                 </a:solidFill>
               </a14:hiddenFill>
             </a:ext>
             <a:ext uri="{91240B29-F687-4f45-9708-019B960494DF}">
-              <a14:hiddenLine xmlns="" xmlns:a14="http://schemas.microsoft.com/office/drawing/2010/main" w="9525">
+              <a14:hiddenLine xmlns:a14="http://schemas.microsoft.com/office/drawing/2010/main" xmlns="" w="9525">
                 <a:solidFill>
                   <a:schemeClr val="tx1"/>
                 </a:solidFill>
@@ -5123,7 +5123,7 @@
               </a14:hiddenLine>
             </a:ext>
             <a:ext uri="{AF507438-7753-43e0-B8FC-AC1667EBCBE1}">
-              <a14:hiddenEffects xmlns="" xmlns:a14="http://schemas.microsoft.com/office/drawing/2010/main">
+              <a14:hiddenEffects xmlns:a14="http://schemas.microsoft.com/office/drawing/2010/main" xmlns="">
                 <a:effectLst>
                   <a:outerShdw dist="35921" dir="2700000" algn="ctr" rotWithShape="0">
                     <a:schemeClr val="bg2"/>
@@ -5170,14 +5170,14 @@
           <a:effectLst/>
           <a:extLst>
             <a:ext uri="{909E8E84-426E-40dd-AFC4-6F175D3DCCD1}">
-              <a14:hiddenFill xmlns="" xmlns:a14="http://schemas.microsoft.com/office/drawing/2010/main">
+              <a14:hiddenFill xmlns:a14="http://schemas.microsoft.com/office/drawing/2010/main" xmlns="">
                 <a:solidFill>
                   <a:schemeClr val="accent1"/>
                 </a:solidFill>
               </a14:hiddenFill>
             </a:ext>
             <a:ext uri="{91240B29-F687-4f45-9708-019B960494DF}">
-              <a14:hiddenLine xmlns="" xmlns:a14="http://schemas.microsoft.com/office/drawing/2010/main" w="9525">
+              <a14:hiddenLine xmlns:a14="http://schemas.microsoft.com/office/drawing/2010/main" xmlns="" w="9525">
                 <a:solidFill>
                   <a:schemeClr val="tx1"/>
                 </a:solidFill>
@@ -5187,7 +5187,7 @@
               </a14:hiddenLine>
             </a:ext>
             <a:ext uri="{AF507438-7753-43e0-B8FC-AC1667EBCBE1}">
-              <a14:hiddenEffects xmlns="" xmlns:a14="http://schemas.microsoft.com/office/drawing/2010/main">
+              <a14:hiddenEffects xmlns:a14="http://schemas.microsoft.com/office/drawing/2010/main" xmlns="">
                 <a:effectLst>
                   <a:outerShdw dist="35921" dir="2700000" algn="ctr" rotWithShape="0">
                     <a:schemeClr val="bg2"/>
@@ -5522,7 +5522,7 @@
           <a:noFill/>
           <a:extLst>
             <a:ext uri="{909E8E84-426E-40dd-AFC4-6F175D3DCCD1}">
-              <a14:hiddenFill xmlns="" xmlns:a14="http://schemas.microsoft.com/office/drawing/2010/main">
+              <a14:hiddenFill xmlns:a14="http://schemas.microsoft.com/office/drawing/2010/main" xmlns="">
                 <a:solidFill>
                   <a:srgbClr val="FFFFFF"/>
                 </a:solidFill>
@@ -5561,7 +5561,7 @@
           <a:noFill/>
           <a:extLst>
             <a:ext uri="{909E8E84-426E-40dd-AFC4-6F175D3DCCD1}">
-              <a14:hiddenFill xmlns="" xmlns:a14="http://schemas.microsoft.com/office/drawing/2010/main">
+              <a14:hiddenFill xmlns:a14="http://schemas.microsoft.com/office/drawing/2010/main" xmlns="">
                 <a:solidFill>
                   <a:srgbClr val="FFFFFF"/>
                 </a:solidFill>
@@ -5613,7 +5613,7 @@
           <a:noFill/>
           <a:extLst>
             <a:ext uri="{909E8E84-426E-40dd-AFC4-6F175D3DCCD1}">
-              <a14:hiddenFill xmlns="" xmlns:a14="http://schemas.microsoft.com/office/drawing/2010/main">
+              <a14:hiddenFill xmlns:a14="http://schemas.microsoft.com/office/drawing/2010/main" xmlns="">
                 <a:solidFill>
                   <a:srgbClr val="FFFFFF"/>
                 </a:solidFill>
@@ -5654,7 +5654,7 @@
           <a:noFill/>
           <a:extLst>
             <a:ext uri="{909E8E84-426E-40dd-AFC4-6F175D3DCCD1}">
-              <a14:hiddenFill xmlns="" xmlns:a14="http://schemas.microsoft.com/office/drawing/2010/main">
+              <a14:hiddenFill xmlns:a14="http://schemas.microsoft.com/office/drawing/2010/main" xmlns="">
                 <a:solidFill>
                   <a:srgbClr val="FFFFFF"/>
                 </a:solidFill>
@@ -5742,14 +5742,14 @@
           <a:effectLst/>
           <a:extLst>
             <a:ext uri="{909E8E84-426E-40dd-AFC4-6F175D3DCCD1}">
-              <a14:hiddenFill xmlns="" xmlns:a14="http://schemas.microsoft.com/office/drawing/2010/main">
+              <a14:hiddenFill xmlns:a14="http://schemas.microsoft.com/office/drawing/2010/main" xmlns="">
                 <a:solidFill>
                   <a:schemeClr val="accent1"/>
                 </a:solidFill>
               </a14:hiddenFill>
             </a:ext>
             <a:ext uri="{91240B29-F687-4f45-9708-019B960494DF}">
-              <a14:hiddenLine xmlns="" xmlns:a14="http://schemas.microsoft.com/office/drawing/2010/main" w="9525">
+              <a14:hiddenLine xmlns:a14="http://schemas.microsoft.com/office/drawing/2010/main" xmlns="" w="9525">
                 <a:solidFill>
                   <a:schemeClr val="tx1"/>
                 </a:solidFill>
@@ -5759,7 +5759,7 @@
               </a14:hiddenLine>
             </a:ext>
             <a:ext uri="{AF507438-7753-43e0-B8FC-AC1667EBCBE1}">
-              <a14:hiddenEffects xmlns="" xmlns:a14="http://schemas.microsoft.com/office/drawing/2010/main">
+              <a14:hiddenEffects xmlns:a14="http://schemas.microsoft.com/office/drawing/2010/main" xmlns="">
                 <a:effectLst>
                   <a:outerShdw dist="35921" dir="2700000" algn="ctr" rotWithShape="0">
                     <a:schemeClr val="bg2"/>
@@ -5806,14 +5806,14 @@
           <a:effectLst/>
           <a:extLst>
             <a:ext uri="{909E8E84-426E-40dd-AFC4-6F175D3DCCD1}">
-              <a14:hiddenFill xmlns="" xmlns:a14="http://schemas.microsoft.com/office/drawing/2010/main">
+              <a14:hiddenFill xmlns:a14="http://schemas.microsoft.com/office/drawing/2010/main" xmlns="">
                 <a:solidFill>
                   <a:schemeClr val="accent1"/>
                 </a:solidFill>
               </a14:hiddenFill>
             </a:ext>
             <a:ext uri="{91240B29-F687-4f45-9708-019B960494DF}">
-              <a14:hiddenLine xmlns="" xmlns:a14="http://schemas.microsoft.com/office/drawing/2010/main" w="9525">
+              <a14:hiddenLine xmlns:a14="http://schemas.microsoft.com/office/drawing/2010/main" xmlns="" w="9525">
                 <a:solidFill>
                   <a:schemeClr val="tx1"/>
                 </a:solidFill>
@@ -5823,7 +5823,7 @@
               </a14:hiddenLine>
             </a:ext>
             <a:ext uri="{AF507438-7753-43e0-B8FC-AC1667EBCBE1}">
-              <a14:hiddenEffects xmlns="" xmlns:a14="http://schemas.microsoft.com/office/drawing/2010/main">
+              <a14:hiddenEffects xmlns:a14="http://schemas.microsoft.com/office/drawing/2010/main" xmlns="">
                 <a:effectLst>
                   <a:outerShdw dist="35921" dir="2700000" algn="ctr" rotWithShape="0">
                     <a:schemeClr val="bg2"/>
@@ -6090,7 +6090,7 @@
           <a:p>
             <a:fld id="{DDFCD08C-45F2-4972-B58E-0165F8DD73B3}" type="datetime1">
               <a:rPr lang="en-US" smtClean="0"/>
-              <a:t>2/3/20</a:t>
+              <a:t>2022-08-26</a:t>
             </a:fld>
             <a:endParaRPr lang="en-US"/>
           </a:p>
@@ -6347,7 +6347,7 @@
           <a:p>
             <a:fld id="{66A92A12-140A-45AD-91E4-8A60410740A7}" type="datetime1">
               <a:rPr lang="en-US" smtClean="0"/>
-              <a:t>2/3/20</a:t>
+              <a:t>2022-08-26</a:t>
             </a:fld>
             <a:endParaRPr lang="en-US"/>
           </a:p>
@@ -6651,7 +6651,7 @@
           <a:p>
             <a:fld id="{52746EDC-9F92-40D0-8564-FB2328CFB04E}" type="datetime1">
               <a:rPr lang="en-US" smtClean="0"/>
-              <a:t>2/3/20</a:t>
+              <a:t>2022-08-26</a:t>
             </a:fld>
             <a:endParaRPr lang="en-US"/>
           </a:p>
@@ -7100,7 +7100,7 @@
           <a:p>
             <a:fld id="{E96C3F91-7C8C-4FDC-BEC9-93A5968DD22D}" type="datetime1">
               <a:rPr lang="en-US" smtClean="0"/>
-              <a:t>2/3/20</a:t>
+              <a:t>2022-08-26</a:t>
             </a:fld>
             <a:endParaRPr lang="en-US"/>
           </a:p>
@@ -7233,7 +7233,7 @@
           <a:p>
             <a:fld id="{ED7B798B-8967-4EDE-918B-8E7C60DB7AA6}" type="datetime1">
               <a:rPr lang="en-US" smtClean="0"/>
-              <a:t>2/3/20</a:t>
+              <a:t>2022-08-26</a:t>
             </a:fld>
             <a:endParaRPr lang="en-US"/>
           </a:p>
@@ -7339,7 +7339,7 @@
           <a:p>
             <a:fld id="{125BCF9E-F679-44BC-9990-211693B5077A}" type="datetime1">
               <a:rPr lang="en-US" smtClean="0"/>
-              <a:t>2/3/20</a:t>
+              <a:t>2022-08-26</a:t>
             </a:fld>
             <a:endParaRPr lang="en-US"/>
           </a:p>
@@ -7688,7 +7688,7 @@
           <a:p>
             <a:fld id="{F2BFDEF7-F228-4136-A2A2-5D84383ABA85}" type="datetime1">
               <a:rPr lang="en-US" smtClean="0"/>
-              <a:t>2/3/20</a:t>
+              <a:t>2022-08-26</a:t>
             </a:fld>
             <a:endParaRPr lang="en-US"/>
           </a:p>
@@ -8057,18 +8057,6 @@
           </a:p>
           <a:p>
             <a:endParaRPr lang="en-US" dirty="0"/>
-          </a:p>
-          <a:p>
-            <a:r>
-              <a:rPr lang="en-US" dirty="0"/>
-              <a:t>CE16 NIHES</a:t>
-            </a:r>
-          </a:p>
-          <a:p>
-            <a:r>
-              <a:rPr lang="en-US" dirty="0"/>
-              <a:t>February, 2020</a:t>
-            </a:r>
           </a:p>
           <a:p>
             <a:endParaRPr lang="en-US" dirty="0"/>

</xml_diff>